<commit_message>
accuracy tbl partially filled
</commit_message>
<xml_diff>
--- a/FinalProject_presentation.pptx
+++ b/FinalProject_presentation.pptx
@@ -12536,6 +12536,11 @@
           </p:cNvGraphicFramePr>
           <p:nvPr>
             <p:ph idx="1"/>
+            <p:extLst>
+              <p:ext uri="{D42A27DB-BD31-4B8C-83A1-F6EECF244321}">
+                <p14:modId xmlns:p14="http://schemas.microsoft.com/office/powerpoint/2010/main" val="968828324"/>
+              </p:ext>
+            </p:extLst>
           </p:nvPr>
         </p:nvGraphicFramePr>
         <p:xfrm>
@@ -12690,9 +12695,10 @@
                     <a:bodyPr/>
                     <a:lstStyle/>
                     <a:p>
+                      <a:pPr algn="ctr"/>
                       <a:r>
                         <a:rPr lang="en-US" dirty="0"/>
-                        <a:t>79%</a:t>
+                        <a:t>80.17%</a:t>
                       </a:r>
                     </a:p>
                   </a:txBody>
@@ -12703,7 +12709,11 @@
                     <a:bodyPr/>
                     <a:lstStyle/>
                     <a:p>
-                      <a:endParaRPr lang="en-US"/>
+                      <a:pPr algn="ctr"/>
+                      <a:r>
+                        <a:rPr lang="en-US" dirty="0"/>
+                        <a:t>78.72%</a:t>
+                      </a:r>
                     </a:p>
                   </a:txBody>
                   <a:tcPr/>
@@ -12713,7 +12723,11 @@
                     <a:bodyPr/>
                     <a:lstStyle/>
                     <a:p>
-                      <a:endParaRPr lang="en-US"/>
+                      <a:pPr algn="ctr"/>
+                      <a:r>
+                        <a:rPr lang="en-US" dirty="0"/>
+                        <a:t>79.07%</a:t>
+                      </a:r>
                     </a:p>
                   </a:txBody>
                   <a:tcPr/>
@@ -12723,7 +12737,11 @@
                     <a:bodyPr/>
                     <a:lstStyle/>
                     <a:p>
-                      <a:endParaRPr lang="en-US" dirty="0"/>
+                      <a:pPr algn="ctr"/>
+                      <a:r>
+                        <a:rPr lang="en-US" dirty="0"/>
+                        <a:t>X</a:t>
+                      </a:r>
                     </a:p>
                   </a:txBody>
                   <a:tcPr/>
@@ -12754,7 +12772,11 @@
                     <a:bodyPr/>
                     <a:lstStyle/>
                     <a:p>
-                      <a:endParaRPr lang="en-US" dirty="0"/>
+                      <a:pPr algn="ctr"/>
+                      <a:r>
+                        <a:rPr lang="en-US" dirty="0"/>
+                        <a:t>80.04%</a:t>
+                      </a:r>
                     </a:p>
                   </a:txBody>
                   <a:tcPr/>
@@ -12764,7 +12786,11 @@
                     <a:bodyPr/>
                     <a:lstStyle/>
                     <a:p>
-                      <a:endParaRPr lang="en-US" dirty="0"/>
+                      <a:pPr algn="ctr"/>
+                      <a:r>
+                        <a:rPr lang="en-US" dirty="0"/>
+                        <a:t>79.11%</a:t>
+                      </a:r>
                     </a:p>
                   </a:txBody>
                   <a:tcPr/>
@@ -12774,7 +12800,11 @@
                     <a:bodyPr/>
                     <a:lstStyle/>
                     <a:p>
-                      <a:endParaRPr lang="en-US" dirty="0"/>
+                      <a:pPr algn="ctr"/>
+                      <a:r>
+                        <a:rPr lang="en-US" dirty="0"/>
+                        <a:t>77.80%</a:t>
+                      </a:r>
                     </a:p>
                   </a:txBody>
                   <a:tcPr/>
@@ -12784,7 +12814,11 @@
                     <a:bodyPr/>
                     <a:lstStyle/>
                     <a:p>
-                      <a:endParaRPr lang="en-US" dirty="0"/>
+                      <a:pPr algn="ctr"/>
+                      <a:r>
+                        <a:rPr lang="en-US" dirty="0"/>
+                        <a:t>X</a:t>
+                      </a:r>
                     </a:p>
                   </a:txBody>
                   <a:tcPr/>
@@ -12815,6 +12849,7 @@
                     <a:bodyPr/>
                     <a:lstStyle/>
                     <a:p>
+                      <a:pPr algn="ctr"/>
                       <a:endParaRPr lang="en-US" dirty="0"/>
                     </a:p>
                   </a:txBody>
@@ -12825,6 +12860,7 @@
                     <a:bodyPr/>
                     <a:lstStyle/>
                     <a:p>
+                      <a:pPr algn="ctr"/>
                       <a:endParaRPr lang="en-US" dirty="0"/>
                     </a:p>
                   </a:txBody>
@@ -12835,6 +12871,7 @@
                     <a:bodyPr/>
                     <a:lstStyle/>
                     <a:p>
+                      <a:pPr algn="ctr"/>
                       <a:endParaRPr lang="en-US" dirty="0"/>
                     </a:p>
                   </a:txBody>
@@ -12845,9 +12882,10 @@
                     <a:bodyPr/>
                     <a:lstStyle/>
                     <a:p>
+                      <a:pPr algn="ctr"/>
                       <a:r>
                         <a:rPr lang="en-US" dirty="0"/>
-                        <a:t>XXXXXX</a:t>
+                        <a:t>79.11%</a:t>
                       </a:r>
                     </a:p>
                   </a:txBody>
@@ -12879,6 +12917,7 @@
                     <a:bodyPr/>
                     <a:lstStyle/>
                     <a:p>
+                      <a:pPr algn="ctr"/>
                       <a:endParaRPr lang="en-US" dirty="0"/>
                     </a:p>
                   </a:txBody>
@@ -12889,6 +12928,7 @@
                     <a:bodyPr/>
                     <a:lstStyle/>
                     <a:p>
+                      <a:pPr algn="ctr"/>
                       <a:endParaRPr lang="en-US" dirty="0"/>
                     </a:p>
                   </a:txBody>
@@ -12899,6 +12939,7 @@
                     <a:bodyPr/>
                     <a:lstStyle/>
                     <a:p>
+                      <a:pPr algn="ctr"/>
                       <a:endParaRPr lang="en-US" dirty="0"/>
                     </a:p>
                   </a:txBody>
@@ -12909,9 +12950,10 @@
                     <a:bodyPr/>
                     <a:lstStyle/>
                     <a:p>
+                      <a:pPr algn="ctr"/>
                       <a:r>
                         <a:rPr lang="en-US" dirty="0"/>
-                        <a:t>#####</a:t>
+                        <a:t>X</a:t>
                       </a:r>
                     </a:p>
                   </a:txBody>
@@ -13026,6 +13068,11 @@
           </p:cNvGraphicFramePr>
           <p:nvPr>
             <p:ph idx="1"/>
+            <p:extLst>
+              <p:ext uri="{D42A27DB-BD31-4B8C-83A1-F6EECF244321}">
+                <p14:modId xmlns:p14="http://schemas.microsoft.com/office/powerpoint/2010/main" val="1535253832"/>
+              </p:ext>
+            </p:extLst>
           </p:nvPr>
         </p:nvGraphicFramePr>
         <p:xfrm>
@@ -13174,10 +13221,7 @@
                     <a:bodyPr/>
                     <a:lstStyle/>
                     <a:p>
-                      <a:r>
-                        <a:rPr lang="en-US" dirty="0"/>
-                        <a:t>79%</a:t>
-                      </a:r>
+                      <a:endParaRPr lang="en-US" dirty="0"/>
                     </a:p>
                   </a:txBody>
                   <a:tcPr/>
@@ -14625,6 +14669,15 @@
 </file>
 
 <file path=customXml/item2.xml><?xml version="1.0" encoding="utf-8"?>
+<?mso-contentType ?>
+<FormTemplates xmlns="http://schemas.microsoft.com/sharepoint/v3/contenttype/forms">
+  <Display>DocumentLibraryForm</Display>
+  <Edit>DocumentLibraryForm</Edit>
+  <New>DocumentLibraryForm</New>
+</FormTemplates>
+</file>
+
+<file path=customXml/item3.xml><?xml version="1.0" encoding="utf-8"?>
 <ct:contentTypeSchema xmlns:ct="http://schemas.microsoft.com/office/2006/metadata/contentType" xmlns:ma="http://schemas.microsoft.com/office/2006/metadata/properties/metaAttributes" ct:_="" ma:_="" ma:contentTypeName="Document" ma:contentTypeID="0x010100D09A4AC55DB23B409F9930A45A577CF8" ma:contentTypeVersion="13" ma:contentTypeDescription="Create a new document." ma:contentTypeScope="" ma:versionID="62863ce91714a6e6926beb841da81f45">
   <xsd:schema xmlns:xsd="http://www.w3.org/2001/XMLSchema" xmlns:xs="http://www.w3.org/2001/XMLSchema" xmlns:p="http://schemas.microsoft.com/office/2006/metadata/properties" xmlns:ns3="7eb5e0e6-c3bc-4107-a33a-80c64eb88319" xmlns:ns4="fedaa18d-8384-436c-aaa0-67ec6927a806" targetNamespace="http://schemas.microsoft.com/office/2006/metadata/properties" ma:root="true" ma:fieldsID="156b1824d531b0327b383d58586d45c8" ns3:_="" ns4:_="">
     <xsd:import namespace="7eb5e0e6-c3bc-4107-a33a-80c64eb88319"/>
@@ -14847,15 +14900,6 @@
 </ct:contentTypeSchema>
 </file>
 
-<file path=customXml/item3.xml><?xml version="1.0" encoding="utf-8"?>
-<?mso-contentType ?>
-<FormTemplates xmlns="http://schemas.microsoft.com/sharepoint/v3/contenttype/forms">
-  <Display>DocumentLibraryForm</Display>
-  <Edit>DocumentLibraryForm</Edit>
-  <New>DocumentLibraryForm</New>
-</FormTemplates>
-</file>
-
 <file path=customXml/itemProps1.xml><?xml version="1.0" encoding="utf-8"?>
 <ds:datastoreItem xmlns:ds="http://schemas.openxmlformats.org/officeDocument/2006/customXml" ds:itemID="{59145ECF-049B-4915-AFF6-4AE84EC42C31}">
   <ds:schemaRefs>
@@ -14874,6 +14918,14 @@
 </file>
 
 <file path=customXml/itemProps2.xml><?xml version="1.0" encoding="utf-8"?>
+<ds:datastoreItem xmlns:ds="http://schemas.openxmlformats.org/officeDocument/2006/customXml" ds:itemID="{C6B9F356-E37B-4A78-945B-3DAA33D11308}">
+  <ds:schemaRefs>
+    <ds:schemaRef ds:uri="http://schemas.microsoft.com/sharepoint/v3/contenttype/forms"/>
+  </ds:schemaRefs>
+</ds:datastoreItem>
+</file>
+
+<file path=customXml/itemProps3.xml><?xml version="1.0" encoding="utf-8"?>
 <ds:datastoreItem xmlns:ds="http://schemas.openxmlformats.org/officeDocument/2006/customXml" ds:itemID="{CDCEAE7F-77A9-4A38-AC78-B7889F39FB25}">
   <ds:schemaRefs>
     <ds:schemaRef ds:uri="http://schemas.microsoft.com/office/2006/metadata/contentType"/>
@@ -14890,12 +14942,4 @@
     <ds:schemaRef ds:uri="http://schemas.microsoft.com/internal/obd"/>
   </ds:schemaRefs>
 </ds:datastoreItem>
-</file>
-
-<file path=customXml/itemProps3.xml><?xml version="1.0" encoding="utf-8"?>
-<ds:datastoreItem xmlns:ds="http://schemas.openxmlformats.org/officeDocument/2006/customXml" ds:itemID="{C6B9F356-E37B-4A78-945B-3DAA33D11308}">
-  <ds:schemaRefs>
-    <ds:schemaRef ds:uri="http://schemas.microsoft.com/sharepoint/v3/contenttype/forms"/>
-  </ds:schemaRefs>
-</ds:datastoreItem>
 </file>
</xml_diff>